<commit_message>
Update Powerpoint, remove old chart
</commit_message>
<xml_diff>
--- a/Mean Reversion - Project Semester 1 2022.pptx
+++ b/Mean Reversion - Project Semester 1 2022.pptx
@@ -217,7 +217,7 @@
           <a:p>
             <a:fld id="{2CCEC765-07FD-4772-879A-B1808237B269}" type="datetimeFigureOut">
               <a:rPr lang="en-AU" smtClean="0"/>
-              <a:t>27/01/2022</a:t>
+              <a:t>1/03/2022</a:t>
             </a:fld>
             <a:endParaRPr lang="en-AU"/>
           </a:p>
@@ -395,7 +395,7 @@
           <a:p>
             <a:fld id="{39563B56-85E3-484F-A5A0-A00E522ABD63}" type="datetimeFigureOut">
               <a:rPr lang="en-AU" smtClean="0"/>
-              <a:t>27/01/2022</a:t>
+              <a:t>1/03/2022</a:t>
             </a:fld>
             <a:endParaRPr lang="en-AU"/>
           </a:p>
@@ -1002,7 +1002,7 @@
           <a:p>
             <a:fld id="{4BB64F86-CCB0-48E5-907B-16003F7352B9}" type="datetime1">
               <a:rPr lang="en-AU" smtClean="0"/>
-              <a:t>27/01/2022</a:t>
+              <a:t>1/03/2022</a:t>
             </a:fld>
             <a:endParaRPr lang="en-AU"/>
           </a:p>
@@ -1212,7 +1212,7 @@
           <a:p>
             <a:fld id="{F94139E3-4F32-4579-B700-1BFD9D6316B1}" type="datetime1">
               <a:rPr lang="en-AU" smtClean="0"/>
-              <a:t>27/01/2022</a:t>
+              <a:t>1/03/2022</a:t>
             </a:fld>
             <a:endParaRPr lang="en-AU"/>
           </a:p>
@@ -1604,7 +1604,7 @@
           <a:p>
             <a:fld id="{220E72B8-329D-4704-B35D-237D6C48EE10}" type="datetime1">
               <a:rPr lang="en-AU" smtClean="0"/>
-              <a:t>27/01/2022</a:t>
+              <a:t>1/03/2022</a:t>
             </a:fld>
             <a:endParaRPr lang="en-AU" dirty="0"/>
           </a:p>
@@ -2112,7 +2112,7 @@
           <a:p>
             <a:fld id="{AF151B2F-5A2E-4CD6-979C-4A85A2E5B747}" type="datetime1">
               <a:rPr lang="en-AU" smtClean="0"/>
-              <a:t>27/01/2022</a:t>
+              <a:t>1/03/2022</a:t>
             </a:fld>
             <a:endParaRPr lang="en-AU"/>
           </a:p>
@@ -2380,7 +2380,7 @@
           <a:p>
             <a:fld id="{CED6E76D-4070-4594-BDD3-33EDDA26D675}" type="datetime1">
               <a:rPr lang="en-AU" smtClean="0"/>
-              <a:t>27/01/2022</a:t>
+              <a:t>1/03/2022</a:t>
             </a:fld>
             <a:endParaRPr lang="en-AU"/>
           </a:p>
@@ -2795,7 +2795,7 @@
           <a:p>
             <a:fld id="{DAADBCC5-374E-405C-B70E-A4F7C86276B2}" type="datetime1">
               <a:rPr lang="en-AU" smtClean="0"/>
-              <a:t>27/01/2022</a:t>
+              <a:t>1/03/2022</a:t>
             </a:fld>
             <a:endParaRPr lang="en-AU"/>
           </a:p>
@@ -2937,7 +2937,7 @@
           <a:p>
             <a:fld id="{24E72117-35D4-4034-8165-2D06278B570B}" type="datetime1">
               <a:rPr lang="en-AU" smtClean="0"/>
-              <a:t>27/01/2022</a:t>
+              <a:t>1/03/2022</a:t>
             </a:fld>
             <a:endParaRPr lang="en-AU"/>
           </a:p>
@@ -3050,7 +3050,7 @@
           <a:p>
             <a:fld id="{A2526C0B-0653-4A30-B649-AB4E8A0CE9CF}" type="datetime1">
               <a:rPr lang="en-AU" smtClean="0"/>
-              <a:t>27/01/2022</a:t>
+              <a:t>1/03/2022</a:t>
             </a:fld>
             <a:endParaRPr lang="en-AU"/>
           </a:p>
@@ -3363,7 +3363,7 @@
           <a:p>
             <a:fld id="{F00670FE-B6D9-4187-9DB7-8B5D1B54FFBA}" type="datetime1">
               <a:rPr lang="en-AU" smtClean="0"/>
-              <a:t>27/01/2022</a:t>
+              <a:t>1/03/2022</a:t>
             </a:fld>
             <a:endParaRPr lang="en-AU"/>
           </a:p>
@@ -3652,7 +3652,7 @@
           <a:p>
             <a:fld id="{3335748D-4763-4649-A209-A5EFA54628B6}" type="datetime1">
               <a:rPr lang="en-AU" smtClean="0"/>
-              <a:t>27/01/2022</a:t>
+              <a:t>1/03/2022</a:t>
             </a:fld>
             <a:endParaRPr lang="en-AU"/>
           </a:p>
@@ -3898,7 +3898,7 @@
           <a:p>
             <a:fld id="{EB663D97-2F57-4B17-AA6F-F6A672E7E853}" type="datetime1">
               <a:rPr lang="en-AU" smtClean="0"/>
-              <a:t>27/01/2022</a:t>
+              <a:t>1/03/2022</a:t>
             </a:fld>
             <a:endParaRPr lang="en-AU"/>
           </a:p>
@@ -4603,7 +4603,7 @@
             <a:fld id="{7715FA3A-4C3B-4528-BBB2-83DB65A19B94}" type="datetime1">
               <a:rPr lang="en-AU" sz="1200" smtClean="0"/>
               <a:pPr/>
-              <a:t>27/01/2022</a:t>
+              <a:t>1/03/2022</a:t>
             </a:fld>
             <a:endParaRPr lang="en-AU" sz="1200" dirty="0"/>
           </a:p>
@@ -4919,15 +4919,7 @@
           <a:p>
             <a:r>
               <a:rPr lang="en-AU" dirty="0"/>
-              <a:t>What is </a:t>
-            </a:r>
-            <a:r>
-              <a:rPr lang="en-AU" dirty="0" err="1"/>
-              <a:t>Vectorbt</a:t>
-            </a:r>
-            <a:r>
-              <a:rPr lang="en-AU" dirty="0"/>
-              <a:t>?</a:t>
+              <a:t>How do we create a strategy?</a:t>
             </a:r>
           </a:p>
         </p:txBody>

</xml_diff>

<commit_message>
Update Mean Reversion - Project Semester 1 2022.pptx
</commit_message>
<xml_diff>
--- a/Mean Reversion - Project Semester 1 2022.pptx
+++ b/Mean Reversion - Project Semester 1 2022.pptx
@@ -5,18 +5,23 @@
     <p:sldMasterId id="2147483648" r:id="rId1"/>
   </p:sldMasterIdLst>
   <p:notesMasterIdLst>
-    <p:notesMasterId r:id="rId8"/>
+    <p:notesMasterId r:id="rId13"/>
   </p:notesMasterIdLst>
   <p:handoutMasterIdLst>
-    <p:handoutMasterId r:id="rId9"/>
+    <p:handoutMasterId r:id="rId14"/>
   </p:handoutMasterIdLst>
   <p:sldIdLst>
     <p:sldId id="256" r:id="rId2"/>
-    <p:sldId id="258" r:id="rId3"/>
-    <p:sldId id="259" r:id="rId4"/>
-    <p:sldId id="260" r:id="rId5"/>
-    <p:sldId id="261" r:id="rId6"/>
-    <p:sldId id="262" r:id="rId7"/>
+    <p:sldId id="259" r:id="rId3"/>
+    <p:sldId id="264" r:id="rId4"/>
+    <p:sldId id="263" r:id="rId5"/>
+    <p:sldId id="260" r:id="rId6"/>
+    <p:sldId id="265" r:id="rId7"/>
+    <p:sldId id="266" r:id="rId8"/>
+    <p:sldId id="267" r:id="rId9"/>
+    <p:sldId id="261" r:id="rId10"/>
+    <p:sldId id="262" r:id="rId11"/>
+    <p:sldId id="258" r:id="rId12"/>
   </p:sldIdLst>
   <p:sldSz cx="12192000" cy="6858000"/>
   <p:notesSz cx="6858000" cy="9144000"/>
@@ -217,7 +222,7 @@
           <a:p>
             <a:fld id="{2CCEC765-07FD-4772-879A-B1808237B269}" type="datetimeFigureOut">
               <a:rPr lang="en-AU" smtClean="0"/>
-              <a:t>1/03/2022</a:t>
+              <a:t>14/03/2022</a:t>
             </a:fld>
             <a:endParaRPr lang="en-AU"/>
           </a:p>
@@ -395,7 +400,7 @@
           <a:p>
             <a:fld id="{39563B56-85E3-484F-A5A0-A00E522ABD63}" type="datetimeFigureOut">
               <a:rPr lang="en-AU" smtClean="0"/>
-              <a:t>1/03/2022</a:t>
+              <a:t>14/03/2022</a:t>
             </a:fld>
             <a:endParaRPr lang="en-AU"/>
           </a:p>
@@ -1002,7 +1007,7 @@
           <a:p>
             <a:fld id="{4BB64F86-CCB0-48E5-907B-16003F7352B9}" type="datetime1">
               <a:rPr lang="en-AU" smtClean="0"/>
-              <a:t>1/03/2022</a:t>
+              <a:t>14/03/2022</a:t>
             </a:fld>
             <a:endParaRPr lang="en-AU"/>
           </a:p>
@@ -1212,7 +1217,7 @@
           <a:p>
             <a:fld id="{F94139E3-4F32-4579-B700-1BFD9D6316B1}" type="datetime1">
               <a:rPr lang="en-AU" smtClean="0"/>
-              <a:t>1/03/2022</a:t>
+              <a:t>14/03/2022</a:t>
             </a:fld>
             <a:endParaRPr lang="en-AU"/>
           </a:p>
@@ -1604,7 +1609,7 @@
           <a:p>
             <a:fld id="{220E72B8-329D-4704-B35D-237D6C48EE10}" type="datetime1">
               <a:rPr lang="en-AU" smtClean="0"/>
-              <a:t>1/03/2022</a:t>
+              <a:t>14/03/2022</a:t>
             </a:fld>
             <a:endParaRPr lang="en-AU" dirty="0"/>
           </a:p>
@@ -2112,7 +2117,7 @@
           <a:p>
             <a:fld id="{AF151B2F-5A2E-4CD6-979C-4A85A2E5B747}" type="datetime1">
               <a:rPr lang="en-AU" smtClean="0"/>
-              <a:t>1/03/2022</a:t>
+              <a:t>14/03/2022</a:t>
             </a:fld>
             <a:endParaRPr lang="en-AU"/>
           </a:p>
@@ -2380,7 +2385,7 @@
           <a:p>
             <a:fld id="{CED6E76D-4070-4594-BDD3-33EDDA26D675}" type="datetime1">
               <a:rPr lang="en-AU" smtClean="0"/>
-              <a:t>1/03/2022</a:t>
+              <a:t>14/03/2022</a:t>
             </a:fld>
             <a:endParaRPr lang="en-AU"/>
           </a:p>
@@ -2795,7 +2800,7 @@
           <a:p>
             <a:fld id="{DAADBCC5-374E-405C-B70E-A4F7C86276B2}" type="datetime1">
               <a:rPr lang="en-AU" smtClean="0"/>
-              <a:t>1/03/2022</a:t>
+              <a:t>14/03/2022</a:t>
             </a:fld>
             <a:endParaRPr lang="en-AU"/>
           </a:p>
@@ -2937,7 +2942,7 @@
           <a:p>
             <a:fld id="{24E72117-35D4-4034-8165-2D06278B570B}" type="datetime1">
               <a:rPr lang="en-AU" smtClean="0"/>
-              <a:t>1/03/2022</a:t>
+              <a:t>14/03/2022</a:t>
             </a:fld>
             <a:endParaRPr lang="en-AU"/>
           </a:p>
@@ -3050,7 +3055,7 @@
           <a:p>
             <a:fld id="{A2526C0B-0653-4A30-B649-AB4E8A0CE9CF}" type="datetime1">
               <a:rPr lang="en-AU" smtClean="0"/>
-              <a:t>1/03/2022</a:t>
+              <a:t>14/03/2022</a:t>
             </a:fld>
             <a:endParaRPr lang="en-AU"/>
           </a:p>
@@ -3363,7 +3368,7 @@
           <a:p>
             <a:fld id="{F00670FE-B6D9-4187-9DB7-8B5D1B54FFBA}" type="datetime1">
               <a:rPr lang="en-AU" smtClean="0"/>
-              <a:t>1/03/2022</a:t>
+              <a:t>14/03/2022</a:t>
             </a:fld>
             <a:endParaRPr lang="en-AU"/>
           </a:p>
@@ -3652,7 +3657,7 @@
           <a:p>
             <a:fld id="{3335748D-4763-4649-A209-A5EFA54628B6}" type="datetime1">
               <a:rPr lang="en-AU" smtClean="0"/>
-              <a:t>1/03/2022</a:t>
+              <a:t>14/03/2022</a:t>
             </a:fld>
             <a:endParaRPr lang="en-AU"/>
           </a:p>
@@ -3898,7 +3903,7 @@
           <a:p>
             <a:fld id="{EB663D97-2F57-4B17-AA6F-F6A672E7E853}" type="datetime1">
               <a:rPr lang="en-AU" smtClean="0"/>
-              <a:t>1/03/2022</a:t>
+              <a:t>14/03/2022</a:t>
             </a:fld>
             <a:endParaRPr lang="en-AU"/>
           </a:p>
@@ -4474,7 +4479,7 @@
                 </a:solidFill>
                 <a:latin typeface="Daytona" panose="020B0604030500040204" pitchFamily="34" charset="0"/>
               </a:rPr>
-              <a:t>Month Date, Year</a:t>
+              <a:t>March 16th, 2022</a:t>
             </a:r>
           </a:p>
         </p:txBody>
@@ -4600,12 +4605,10 @@
             </a:lvl9pPr>
           </a:lstStyle>
           <a:p>
-            <a:fld id="{7715FA3A-4C3B-4528-BBB2-83DB65A19B94}" type="datetime1">
-              <a:rPr lang="en-AU" sz="1200" smtClean="0"/>
-              <a:pPr/>
-              <a:t>1/03/2022</a:t>
-            </a:fld>
-            <a:endParaRPr lang="en-AU" sz="1200" dirty="0"/>
+            <a:r>
+              <a:rPr lang="en-AU" sz="1200" dirty="0"/>
+              <a:t>16/03/2022</a:t>
+            </a:r>
           </a:p>
         </p:txBody>
       </p:sp>
@@ -4613,6 +4616,259 @@
     <p:extLst>
       <p:ext uri="{BB962C8B-B14F-4D97-AF65-F5344CB8AC3E}">
         <p14:creationId xmlns:p14="http://schemas.microsoft.com/office/powerpoint/2010/main" val="3999408668"/>
+      </p:ext>
+    </p:extLst>
+  </p:cSld>
+  <p:clrMapOvr>
+    <a:masterClrMapping/>
+  </p:clrMapOvr>
+</p:sld>
+</file>
+
+<file path=ppt/slides/slide10.xml><?xml version="1.0" encoding="utf-8"?>
+<p:sld xmlns:a="http://schemas.openxmlformats.org/drawingml/2006/main" xmlns:r="http://schemas.openxmlformats.org/officeDocument/2006/relationships" xmlns:p="http://schemas.openxmlformats.org/presentationml/2006/main">
+  <p:cSld>
+    <p:spTree>
+      <p:nvGrpSpPr>
+        <p:cNvPr id="1" name=""/>
+        <p:cNvGrpSpPr/>
+        <p:nvPr/>
+      </p:nvGrpSpPr>
+      <p:grpSpPr>
+        <a:xfrm>
+          <a:off x="0" y="0"/>
+          <a:ext cx="0" cy="0"/>
+          <a:chOff x="0" y="0"/>
+          <a:chExt cx="0" cy="0"/>
+        </a:xfrm>
+      </p:grpSpPr>
+      <p:sp>
+        <p:nvSpPr>
+          <p:cNvPr id="2" name="Title 1">
+            <a:extLst>
+              <a:ext uri="{FF2B5EF4-FFF2-40B4-BE49-F238E27FC236}">
+                <a16:creationId xmlns:a16="http://schemas.microsoft.com/office/drawing/2014/main" id="{7A805161-F0A5-4BDB-9483-42E1C006804A}"/>
+              </a:ext>
+            </a:extLst>
+          </p:cNvPr>
+          <p:cNvSpPr>
+            <a:spLocks noGrp="1"/>
+          </p:cNvSpPr>
+          <p:nvPr>
+            <p:ph type="title"/>
+          </p:nvPr>
+        </p:nvSpPr>
+        <p:spPr/>
+        <p:txBody>
+          <a:bodyPr/>
+          <a:lstStyle/>
+          <a:p>
+            <a:r>
+              <a:rPr lang="en-AU" dirty="0"/>
+              <a:t>Project Details</a:t>
+            </a:r>
+          </a:p>
+        </p:txBody>
+      </p:sp>
+      <p:sp>
+        <p:nvSpPr>
+          <p:cNvPr id="3" name="Content Placeholder 2">
+            <a:extLst>
+              <a:ext uri="{FF2B5EF4-FFF2-40B4-BE49-F238E27FC236}">
+                <a16:creationId xmlns:a16="http://schemas.microsoft.com/office/drawing/2014/main" id="{A122FA3A-4F74-4CFB-9512-97448506F8E3}"/>
+              </a:ext>
+            </a:extLst>
+          </p:cNvPr>
+          <p:cNvSpPr>
+            <a:spLocks noGrp="1"/>
+          </p:cNvSpPr>
+          <p:nvPr>
+            <p:ph idx="1"/>
+          </p:nvPr>
+        </p:nvSpPr>
+        <p:spPr/>
+        <p:txBody>
+          <a:bodyPr>
+            <a:normAutofit/>
+          </a:bodyPr>
+          <a:lstStyle/>
+          <a:p>
+            <a:pPr marL="0" indent="0">
+              <a:buNone/>
+            </a:pPr>
+            <a:r>
+              <a:rPr lang="en-US" dirty="0"/>
+              <a:t>Project Details:</a:t>
+            </a:r>
+          </a:p>
+          <a:p>
+            <a:r>
+              <a:rPr lang="en-US" dirty="0"/>
+              <a:t>Within your team, your goal is to build a trading strategy based on Mean Reversion</a:t>
+            </a:r>
+          </a:p>
+          <a:p>
+            <a:r>
+              <a:rPr lang="en-US" dirty="0"/>
+              <a:t>Fees: $10 per trade flat rate, buy and sell.</a:t>
+            </a:r>
+          </a:p>
+          <a:p>
+            <a:r>
+              <a:rPr lang="en-US" dirty="0"/>
+              <a:t>Starting Balance: $5,000</a:t>
+            </a:r>
+          </a:p>
+          <a:p>
+            <a:r>
+              <a:rPr lang="en-US" dirty="0"/>
+              <a:t>Data Resolution: 1 minute data will be tested</a:t>
+            </a:r>
+          </a:p>
+          <a:p>
+            <a:r>
+              <a:rPr lang="en-US" dirty="0"/>
+              <a:t>Data Source: Will be tested on random stocks in Top 500 American Companies.</a:t>
+            </a:r>
+          </a:p>
+        </p:txBody>
+      </p:sp>
+    </p:spTree>
+    <p:extLst>
+      <p:ext uri="{BB962C8B-B14F-4D97-AF65-F5344CB8AC3E}">
+        <p14:creationId xmlns:p14="http://schemas.microsoft.com/office/powerpoint/2010/main" val="1551378890"/>
+      </p:ext>
+    </p:extLst>
+  </p:cSld>
+  <p:clrMapOvr>
+    <a:masterClrMapping/>
+  </p:clrMapOvr>
+</p:sld>
+</file>
+
+<file path=ppt/slides/slide11.xml><?xml version="1.0" encoding="utf-8"?>
+<p:sld xmlns:a="http://schemas.openxmlformats.org/drawingml/2006/main" xmlns:r="http://schemas.openxmlformats.org/officeDocument/2006/relationships" xmlns:p="http://schemas.openxmlformats.org/presentationml/2006/main">
+  <p:cSld>
+    <p:spTree>
+      <p:nvGrpSpPr>
+        <p:cNvPr id="1" name=""/>
+        <p:cNvGrpSpPr/>
+        <p:nvPr/>
+      </p:nvGrpSpPr>
+      <p:grpSpPr>
+        <a:xfrm>
+          <a:off x="0" y="0"/>
+          <a:ext cx="0" cy="0"/>
+          <a:chOff x="0" y="0"/>
+          <a:chExt cx="0" cy="0"/>
+        </a:xfrm>
+      </p:grpSpPr>
+      <p:sp>
+        <p:nvSpPr>
+          <p:cNvPr id="3" name="Content Placeholder 2">
+            <a:extLst>
+              <a:ext uri="{FF2B5EF4-FFF2-40B4-BE49-F238E27FC236}">
+                <a16:creationId xmlns:a16="http://schemas.microsoft.com/office/drawing/2014/main" id="{65A3413E-C6C0-4A00-9536-E6B00F15397A}"/>
+              </a:ext>
+            </a:extLst>
+          </p:cNvPr>
+          <p:cNvSpPr>
+            <a:spLocks noGrp="1"/>
+          </p:cNvSpPr>
+          <p:nvPr>
+            <p:ph idx="1"/>
+          </p:nvPr>
+        </p:nvSpPr>
+        <p:spPr/>
+        <p:txBody>
+          <a:bodyPr/>
+          <a:lstStyle/>
+          <a:p>
+            <a:r>
+              <a:rPr lang="en-AU" dirty="0"/>
+              <a:t>Start of the Project</a:t>
+            </a:r>
+          </a:p>
+          <a:p>
+            <a:pPr lvl="1"/>
+            <a:r>
+              <a:rPr lang="en-AU" dirty="0"/>
+              <a:t>Today!</a:t>
+            </a:r>
+          </a:p>
+          <a:p>
+            <a:r>
+              <a:rPr lang="en-AU" dirty="0"/>
+              <a:t>Due Date</a:t>
+            </a:r>
+          </a:p>
+          <a:p>
+            <a:pPr lvl="1"/>
+            <a:r>
+              <a:rPr lang="en-AU" dirty="0"/>
+              <a:t>Study Week (Week 8). Roughly 24</a:t>
+            </a:r>
+            <a:r>
+              <a:rPr lang="en-AU" baseline="30000" dirty="0"/>
+              <a:t>th</a:t>
+            </a:r>
+            <a:r>
+              <a:rPr lang="en-AU" dirty="0"/>
+              <a:t> April</a:t>
+            </a:r>
+          </a:p>
+          <a:p>
+            <a:r>
+              <a:rPr lang="en-AU" dirty="0"/>
+              <a:t>Midway Meeting</a:t>
+            </a:r>
+          </a:p>
+          <a:p>
+            <a:pPr lvl="1"/>
+            <a:r>
+              <a:rPr lang="en-AU" dirty="0"/>
+              <a:t>Sometime in Week 5 (According to availability)</a:t>
+            </a:r>
+          </a:p>
+        </p:txBody>
+      </p:sp>
+      <p:sp>
+        <p:nvSpPr>
+          <p:cNvPr id="7" name="Title 1">
+            <a:extLst>
+              <a:ext uri="{FF2B5EF4-FFF2-40B4-BE49-F238E27FC236}">
+                <a16:creationId xmlns:a16="http://schemas.microsoft.com/office/drawing/2014/main" id="{EE4C6EC7-715A-4B43-B702-E7A504DBB017}"/>
+              </a:ext>
+            </a:extLst>
+          </p:cNvPr>
+          <p:cNvSpPr>
+            <a:spLocks noGrp="1"/>
+          </p:cNvSpPr>
+          <p:nvPr>
+            <p:ph type="title"/>
+          </p:nvPr>
+        </p:nvSpPr>
+        <p:spPr>
+          <a:xfrm>
+            <a:off x="838200" y="18255"/>
+            <a:ext cx="10515600" cy="1325563"/>
+          </a:xfrm>
+        </p:spPr>
+        <p:txBody>
+          <a:bodyPr/>
+          <a:lstStyle/>
+          <a:p>
+            <a:r>
+              <a:rPr lang="en-AU" dirty="0"/>
+              <a:t>Timeline of the Project</a:t>
+            </a:r>
+          </a:p>
+        </p:txBody>
+      </p:sp>
+    </p:spTree>
+    <p:extLst>
+      <p:ext uri="{BB962C8B-B14F-4D97-AF65-F5344CB8AC3E}">
+        <p14:creationId xmlns:p14="http://schemas.microsoft.com/office/powerpoint/2010/main" val="2615060428"/>
       </p:ext>
     </p:extLst>
   </p:cSld>
@@ -4641,18 +4897,18 @@
       </p:grpSpPr>
       <p:sp>
         <p:nvSpPr>
-          <p:cNvPr id="3" name="Content Placeholder 2">
-            <a:extLst>
-              <a:ext uri="{FF2B5EF4-FFF2-40B4-BE49-F238E27FC236}">
-                <a16:creationId xmlns:a16="http://schemas.microsoft.com/office/drawing/2014/main" id="{65A3413E-C6C0-4A00-9536-E6B00F15397A}"/>
-              </a:ext>
-            </a:extLst>
-          </p:cNvPr>
-          <p:cNvSpPr>
-            <a:spLocks noGrp="1"/>
-          </p:cNvSpPr>
-          <p:nvPr>
-            <p:ph idx="1"/>
+          <p:cNvPr id="2" name="Title 1">
+            <a:extLst>
+              <a:ext uri="{FF2B5EF4-FFF2-40B4-BE49-F238E27FC236}">
+                <a16:creationId xmlns:a16="http://schemas.microsoft.com/office/drawing/2014/main" id="{B5AB6086-AAE4-46FA-8919-C60E85AF8E78}"/>
+              </a:ext>
+            </a:extLst>
+          </p:cNvPr>
+          <p:cNvSpPr>
+            <a:spLocks noGrp="1"/>
+          </p:cNvSpPr>
+          <p:nvPr>
+            <p:ph type="title"/>
           </p:nvPr>
         </p:nvSpPr>
         <p:spPr/>
@@ -4660,50 +4916,96 @@
           <a:bodyPr/>
           <a:lstStyle/>
           <a:p>
+            <a:r>
+              <a:rPr lang="en-AU" dirty="0"/>
+              <a:t>What is Mean Reversion?</a:t>
+            </a:r>
+          </a:p>
+        </p:txBody>
+      </p:sp>
+      <p:sp>
+        <p:nvSpPr>
+          <p:cNvPr id="3" name="Content Placeholder 2">
+            <a:extLst>
+              <a:ext uri="{FF2B5EF4-FFF2-40B4-BE49-F238E27FC236}">
+                <a16:creationId xmlns:a16="http://schemas.microsoft.com/office/drawing/2014/main" id="{702697F2-40EB-48BD-8EB6-9516FFC0F8B6}"/>
+              </a:ext>
+            </a:extLst>
+          </p:cNvPr>
+          <p:cNvSpPr>
+            <a:spLocks noGrp="1"/>
+          </p:cNvSpPr>
+          <p:nvPr>
+            <p:ph idx="1"/>
+          </p:nvPr>
+        </p:nvSpPr>
+        <p:spPr/>
+        <p:txBody>
+          <a:bodyPr>
+            <a:normAutofit/>
+          </a:bodyPr>
+          <a:lstStyle/>
+          <a:p>
             <a:pPr marL="0" indent="0">
               <a:buNone/>
             </a:pPr>
-            <a:endParaRPr lang="en-AU" dirty="0"/>
-          </a:p>
-        </p:txBody>
-      </p:sp>
-      <p:sp>
-        <p:nvSpPr>
-          <p:cNvPr id="7" name="Title 1">
-            <a:extLst>
-              <a:ext uri="{FF2B5EF4-FFF2-40B4-BE49-F238E27FC236}">
-                <a16:creationId xmlns:a16="http://schemas.microsoft.com/office/drawing/2014/main" id="{EE4C6EC7-715A-4B43-B702-E7A504DBB017}"/>
-              </a:ext>
-            </a:extLst>
-          </p:cNvPr>
-          <p:cNvSpPr>
-            <a:spLocks noGrp="1"/>
-          </p:cNvSpPr>
-          <p:nvPr>
-            <p:ph type="title"/>
-          </p:nvPr>
-        </p:nvSpPr>
+            <a:r>
+              <a:rPr lang="en-US" sz="2400" dirty="0"/>
+              <a:t>‘Mean reversion, or reversion to the mean, is a theory used in finance that suggests that asset price volatility and historical returns eventually will revert to the long-run mean or average level of the entire dataset.’</a:t>
+            </a:r>
+          </a:p>
+          <a:p>
+            <a:pPr marL="0" indent="0" algn="ctr">
+              <a:buNone/>
+            </a:pPr>
+            <a:r>
+              <a:rPr lang="en-US" sz="2400" dirty="0"/>
+              <a:t>- Investopedia</a:t>
+            </a:r>
+            <a:endParaRPr lang="en-AU" sz="2400" dirty="0"/>
+          </a:p>
+        </p:txBody>
+      </p:sp>
+      <p:pic>
+        <p:nvPicPr>
+          <p:cNvPr id="5" name="Picture 4" descr="Chart, line chart&#10;&#10;Description automatically generated">
+            <a:extLst>
+              <a:ext uri="{FF2B5EF4-FFF2-40B4-BE49-F238E27FC236}">
+                <a16:creationId xmlns:a16="http://schemas.microsoft.com/office/drawing/2014/main" id="{C74DEEAC-8ADA-41D8-8610-421F0A1B2CF7}"/>
+              </a:ext>
+            </a:extLst>
+          </p:cNvPr>
+          <p:cNvPicPr>
+            <a:picLocks noChangeAspect="1"/>
+          </p:cNvPicPr>
+          <p:nvPr/>
+        </p:nvPicPr>
+        <p:blipFill>
+          <a:blip r:embed="rId2">
+            <a:extLst>
+              <a:ext uri="{28A0092B-C50C-407E-A947-70E740481C1C}">
+                <a14:useLocalDpi xmlns:a14="http://schemas.microsoft.com/office/drawing/2010/main" val="0"/>
+              </a:ext>
+            </a:extLst>
+          </a:blip>
+          <a:stretch>
+            <a:fillRect/>
+          </a:stretch>
+        </p:blipFill>
         <p:spPr>
           <a:xfrm>
-            <a:off x="838200" y="18255"/>
-            <a:ext cx="10515600" cy="1325563"/>
+            <a:off x="2806367" y="3429000"/>
+            <a:ext cx="6579265" cy="3041783"/>
           </a:xfrm>
+          <a:prstGeom prst="rect">
+            <a:avLst/>
+          </a:prstGeom>
         </p:spPr>
-        <p:txBody>
-          <a:bodyPr/>
-          <a:lstStyle/>
-          <a:p>
-            <a:r>
-              <a:rPr lang="en-AU" dirty="0"/>
-              <a:t>Timeline of the Project</a:t>
-            </a:r>
-          </a:p>
-        </p:txBody>
-      </p:sp>
+      </p:pic>
     </p:spTree>
     <p:extLst>
       <p:ext uri="{BB962C8B-B14F-4D97-AF65-F5344CB8AC3E}">
-        <p14:creationId xmlns:p14="http://schemas.microsoft.com/office/powerpoint/2010/main" val="2615060428"/>
+        <p14:creationId xmlns:p14="http://schemas.microsoft.com/office/powerpoint/2010/main" val="1253962778"/>
       </p:ext>
     </p:extLst>
   </p:cSld>
@@ -4735,7 +5037,7 @@
           <p:cNvPr id="2" name="Title 1">
             <a:extLst>
               <a:ext uri="{FF2B5EF4-FFF2-40B4-BE49-F238E27FC236}">
-                <a16:creationId xmlns:a16="http://schemas.microsoft.com/office/drawing/2014/main" id="{B5AB6086-AAE4-46FA-8919-C60E85AF8E78}"/>
+                <a16:creationId xmlns:a16="http://schemas.microsoft.com/office/drawing/2014/main" id="{B2ACA355-ED77-4FD1-90F3-3EF30ED16811}"/>
               </a:ext>
             </a:extLst>
           </p:cNvPr>
@@ -4753,7 +5055,7 @@
           <a:p>
             <a:r>
               <a:rPr lang="en-AU" dirty="0"/>
-              <a:t>What is Mean Reversion?</a:t>
+              <a:t>Financial Terms used in this presentation</a:t>
             </a:r>
           </a:p>
         </p:txBody>
@@ -4763,7 +5065,7 @@
           <p:cNvPr id="3" name="Content Placeholder 2">
             <a:extLst>
               <a:ext uri="{FF2B5EF4-FFF2-40B4-BE49-F238E27FC236}">
-                <a16:creationId xmlns:a16="http://schemas.microsoft.com/office/drawing/2014/main" id="{702697F2-40EB-48BD-8EB6-9516FFC0F8B6}"/>
+                <a16:creationId xmlns:a16="http://schemas.microsoft.com/office/drawing/2014/main" id="{C3DD4AE0-3037-4998-8176-946B42833AAA}"/>
               </a:ext>
             </a:extLst>
           </p:cNvPr>
@@ -4776,17 +5078,28 @@
         </p:nvSpPr>
         <p:spPr/>
         <p:txBody>
-          <a:bodyPr/>
+          <a:bodyPr>
+            <a:normAutofit/>
+          </a:bodyPr>
           <a:lstStyle/>
           <a:p>
-            <a:endParaRPr lang="en-AU" dirty="0"/>
+            <a:r>
+              <a:rPr lang="en-AU" sz="2400" dirty="0"/>
+              <a:t>Long: Going long on a stock means purchasing some stock with the hope that it increases in price, to sell at a profit</a:t>
+            </a:r>
+          </a:p>
+          <a:p>
+            <a:r>
+              <a:rPr lang="en-AU" sz="2400" dirty="0"/>
+              <a:t>Short: Going short on a stock means borrowing stock and selling it, with the promise that you will purchase the stock at a later time, the hope is that the stock decreases in value so you can buy it back for less than you sold it, returning a profit.</a:t>
+            </a:r>
           </a:p>
         </p:txBody>
       </p:sp>
     </p:spTree>
     <p:extLst>
       <p:ext uri="{BB962C8B-B14F-4D97-AF65-F5344CB8AC3E}">
-        <p14:creationId xmlns:p14="http://schemas.microsoft.com/office/powerpoint/2010/main" val="1253962778"/>
+        <p14:creationId xmlns:p14="http://schemas.microsoft.com/office/powerpoint/2010/main" val="2449923670"/>
       </p:ext>
     </p:extLst>
   </p:cSld>
@@ -4818,7 +5131,7 @@
           <p:cNvPr id="2" name="Title 1">
             <a:extLst>
               <a:ext uri="{FF2B5EF4-FFF2-40B4-BE49-F238E27FC236}">
-                <a16:creationId xmlns:a16="http://schemas.microsoft.com/office/drawing/2014/main" id="{BA228986-7201-4B52-8B56-BE5EB5D8894F}"/>
+                <a16:creationId xmlns:a16="http://schemas.microsoft.com/office/drawing/2014/main" id="{51F0CECF-3953-4E20-88C2-2415FEF45C44}"/>
               </a:ext>
             </a:extLst>
           </p:cNvPr>
@@ -4836,7 +5149,7 @@
           <a:p>
             <a:r>
               <a:rPr lang="en-AU" dirty="0"/>
-              <a:t>How is Mean Reversion Calculated?</a:t>
+              <a:t>Mean Reversion – The Basics</a:t>
             </a:r>
           </a:p>
         </p:txBody>
@@ -4846,7 +5159,7 @@
           <p:cNvPr id="3" name="Content Placeholder 2">
             <a:extLst>
               <a:ext uri="{FF2B5EF4-FFF2-40B4-BE49-F238E27FC236}">
-                <a16:creationId xmlns:a16="http://schemas.microsoft.com/office/drawing/2014/main" id="{F7E7F342-8A4A-4F14-B7F5-5559B814CEF8}"/>
+                <a16:creationId xmlns:a16="http://schemas.microsoft.com/office/drawing/2014/main" id="{804E2AAB-A51D-4276-AB5E-1C97FBC73434}"/>
               </a:ext>
             </a:extLst>
           </p:cNvPr>
@@ -4862,14 +5175,38 @@
           <a:bodyPr/>
           <a:lstStyle/>
           <a:p>
-            <a:endParaRPr lang="en-AU"/>
+            <a:pPr marL="0" indent="0">
+              <a:buNone/>
+            </a:pPr>
+            <a:r>
+              <a:rPr lang="en-AU" dirty="0"/>
+              <a:t>Ideally, when a stock is below it’s local mean/average price, you go long on the stock, entering a position in the stock with the hope that it reverts to its mean by increasing in price. Allowing you to sell the stock at a profit.</a:t>
+            </a:r>
+          </a:p>
+          <a:p>
+            <a:pPr marL="0" indent="0">
+              <a:buNone/>
+            </a:pPr>
+            <a:r>
+              <a:rPr lang="en-AU" dirty="0"/>
+              <a:t>When a stock is above it’s local mean, you short the stock, selling the stock with the hope that it reverts to its mean by decreasing in price, allowing you to rebuy the stock at a profit.</a:t>
+            </a:r>
+          </a:p>
+          <a:p>
+            <a:pPr marL="0" indent="0">
+              <a:buNone/>
+            </a:pPr>
+            <a:r>
+              <a:rPr lang="en-AU" dirty="0"/>
+              <a:t>The trick with mean reversion is identifying when a stock is above or below it’s mean, and what sort of safeguards to have in place if a stock doesn’t revert how you expect it to.</a:t>
+            </a:r>
           </a:p>
         </p:txBody>
       </p:sp>
     </p:spTree>
     <p:extLst>
       <p:ext uri="{BB962C8B-B14F-4D97-AF65-F5344CB8AC3E}">
-        <p14:creationId xmlns:p14="http://schemas.microsoft.com/office/powerpoint/2010/main" val="2987946408"/>
+        <p14:creationId xmlns:p14="http://schemas.microsoft.com/office/powerpoint/2010/main" val="3167771302"/>
       </p:ext>
     </p:extLst>
   </p:cSld>
@@ -4901,7 +5238,7 @@
           <p:cNvPr id="2" name="Title 1">
             <a:extLst>
               <a:ext uri="{FF2B5EF4-FFF2-40B4-BE49-F238E27FC236}">
-                <a16:creationId xmlns:a16="http://schemas.microsoft.com/office/drawing/2014/main" id="{75133DA1-42BF-433F-9CD3-BF05A8AE94E4}"/>
+                <a16:creationId xmlns:a16="http://schemas.microsoft.com/office/drawing/2014/main" id="{BA228986-7201-4B52-8B56-BE5EB5D8894F}"/>
               </a:ext>
             </a:extLst>
           </p:cNvPr>
@@ -4919,7 +5256,7 @@
           <a:p>
             <a:r>
               <a:rPr lang="en-AU" dirty="0"/>
-              <a:t>How do we create a strategy?</a:t>
+              <a:t>Mean Reversion - Indicators</a:t>
             </a:r>
           </a:p>
         </p:txBody>
@@ -4929,7 +5266,7 @@
           <p:cNvPr id="3" name="Content Placeholder 2">
             <a:extLst>
               <a:ext uri="{FF2B5EF4-FFF2-40B4-BE49-F238E27FC236}">
-                <a16:creationId xmlns:a16="http://schemas.microsoft.com/office/drawing/2014/main" id="{25B6360A-D5FE-4830-8C19-585FBB7A07BA}"/>
+                <a16:creationId xmlns:a16="http://schemas.microsoft.com/office/drawing/2014/main" id="{F7E7F342-8A4A-4F14-B7F5-5559B814CEF8}"/>
               </a:ext>
             </a:extLst>
           </p:cNvPr>
@@ -4945,14 +5282,26 @@
           <a:bodyPr/>
           <a:lstStyle/>
           <a:p>
-            <a:endParaRPr lang="en-AU"/>
+            <a:pPr marL="0" indent="0">
+              <a:buNone/>
+            </a:pPr>
+            <a:r>
+              <a:rPr lang="en-AU" dirty="0"/>
+              <a:t>There are many different indicators that can signal an algorithm to buy or sell a stock. Here are some of the more common ones</a:t>
+            </a:r>
+          </a:p>
+          <a:p>
+            <a:pPr marL="0" indent="0">
+              <a:buNone/>
+            </a:pPr>
+            <a:endParaRPr lang="en-AU" dirty="0"/>
           </a:p>
         </p:txBody>
       </p:sp>
     </p:spTree>
     <p:extLst>
       <p:ext uri="{BB962C8B-B14F-4D97-AF65-F5344CB8AC3E}">
-        <p14:creationId xmlns:p14="http://schemas.microsoft.com/office/powerpoint/2010/main" val="4079296745"/>
+        <p14:creationId xmlns:p14="http://schemas.microsoft.com/office/powerpoint/2010/main" val="2987946408"/>
       </p:ext>
     </p:extLst>
   </p:cSld>
@@ -4984,7 +5333,7 @@
           <p:cNvPr id="2" name="Title 1">
             <a:extLst>
               <a:ext uri="{FF2B5EF4-FFF2-40B4-BE49-F238E27FC236}">
-                <a16:creationId xmlns:a16="http://schemas.microsoft.com/office/drawing/2014/main" id="{7A805161-F0A5-4BDB-9483-42E1C006804A}"/>
+                <a16:creationId xmlns:a16="http://schemas.microsoft.com/office/drawing/2014/main" id="{3A8C97A2-C174-464E-93D3-06A72696F9FD}"/>
               </a:ext>
             </a:extLst>
           </p:cNvPr>
@@ -5000,7 +5349,10 @@
           <a:bodyPr/>
           <a:lstStyle/>
           <a:p>
-            <a:endParaRPr lang="en-AU"/>
+            <a:r>
+              <a:rPr lang="en-AU" dirty="0"/>
+              <a:t>Bollinger Bands</a:t>
+            </a:r>
           </a:p>
         </p:txBody>
       </p:sp>
@@ -5009,7 +5361,7 @@
           <p:cNvPr id="3" name="Content Placeholder 2">
             <a:extLst>
               <a:ext uri="{FF2B5EF4-FFF2-40B4-BE49-F238E27FC236}">
-                <a16:creationId xmlns:a16="http://schemas.microsoft.com/office/drawing/2014/main" id="{A122FA3A-4F74-4CFB-9512-97448506F8E3}"/>
+                <a16:creationId xmlns:a16="http://schemas.microsoft.com/office/drawing/2014/main" id="{40032DF3-2817-4B44-A0CA-3B35BB7FEBD0}"/>
               </a:ext>
             </a:extLst>
           </p:cNvPr>
@@ -5025,14 +5377,601 @@
           <a:bodyPr/>
           <a:lstStyle/>
           <a:p>
-            <a:endParaRPr lang="en-AU"/>
+            <a:pPr marL="0" indent="0">
+              <a:buNone/>
+            </a:pPr>
+            <a:r>
+              <a:rPr lang="en-AU" dirty="0"/>
+              <a:t>Bollinger Bands are envelopes plotted at a uniform distance above and below the moving average of a price. Usually Bollinger Bands are placed 2 standard deviations from the simple moving average, however this distance can be changed depending on the use-case.</a:t>
+            </a:r>
+          </a:p>
+          <a:p>
+            <a:pPr marL="0" indent="0">
+              <a:buNone/>
+            </a:pPr>
+            <a:endParaRPr lang="en-AU" dirty="0"/>
+          </a:p>
+        </p:txBody>
+      </p:sp>
+      <p:pic>
+        <p:nvPicPr>
+          <p:cNvPr id="5" name="Picture 2" descr="What Are Bollinger Bands? - Fidelity">
+            <a:extLst>
+              <a:ext uri="{FF2B5EF4-FFF2-40B4-BE49-F238E27FC236}">
+                <a16:creationId xmlns:a16="http://schemas.microsoft.com/office/drawing/2014/main" id="{3E5C3785-2D06-4D5B-9102-2A473A99A400}"/>
+              </a:ext>
+            </a:extLst>
+          </p:cNvPr>
+          <p:cNvPicPr>
+            <a:picLocks noChangeAspect="1" noChangeArrowheads="1"/>
+          </p:cNvPicPr>
+          <p:nvPr/>
+        </p:nvPicPr>
+        <p:blipFill>
+          <a:blip r:embed="rId2">
+            <a:extLst>
+              <a:ext uri="{28A0092B-C50C-407E-A947-70E740481C1C}">
+                <a14:useLocalDpi xmlns:a14="http://schemas.microsoft.com/office/drawing/2010/main" val="0"/>
+              </a:ext>
+            </a:extLst>
+          </a:blip>
+          <a:srcRect/>
+          <a:stretch>
+            <a:fillRect/>
+          </a:stretch>
+        </p:blipFill>
+        <p:spPr bwMode="auto">
+          <a:xfrm>
+            <a:off x="989684" y="3583379"/>
+            <a:ext cx="5112847" cy="2930120"/>
+          </a:xfrm>
+          <a:prstGeom prst="rect">
+            <a:avLst/>
+          </a:prstGeom>
+          <a:noFill/>
+          <a:extLst>
+            <a:ext uri="{909E8E84-426E-40DD-AFC4-6F175D3DCCD1}">
+              <a14:hiddenFill xmlns:a14="http://schemas.microsoft.com/office/drawing/2010/main">
+                <a:solidFill>
+                  <a:srgbClr val="FFFFFF"/>
+                </a:solidFill>
+              </a14:hiddenFill>
+            </a:ext>
+          </a:extLst>
+        </p:spPr>
+      </p:pic>
+      <p:sp>
+        <p:nvSpPr>
+          <p:cNvPr id="6" name="Content Placeholder 2">
+            <a:extLst>
+              <a:ext uri="{FF2B5EF4-FFF2-40B4-BE49-F238E27FC236}">
+                <a16:creationId xmlns:a16="http://schemas.microsoft.com/office/drawing/2014/main" id="{DDB99D52-52A9-418F-9F2B-352A85CF9056}"/>
+              </a:ext>
+            </a:extLst>
+          </p:cNvPr>
+          <p:cNvSpPr txBox="1">
+            <a:spLocks/>
+          </p:cNvSpPr>
+          <p:nvPr/>
+        </p:nvSpPr>
+        <p:spPr>
+          <a:xfrm>
+            <a:off x="6234422" y="3449780"/>
+            <a:ext cx="5112847" cy="2930119"/>
+          </a:xfrm>
+          <a:prstGeom prst="rect">
+            <a:avLst/>
+          </a:prstGeom>
+        </p:spPr>
+        <p:txBody>
+          <a:bodyPr vert="horz" lIns="91440" tIns="45720" rIns="91440" bIns="45720" rtlCol="0">
+            <a:normAutofit/>
+          </a:bodyPr>
+          <a:lstStyle>
+            <a:lvl1pPr marL="228600" indent="-228600" algn="l" defTabSz="914400" rtl="0" eaLnBrk="1" latinLnBrk="0" hangingPunct="1">
+              <a:lnSpc>
+                <a:spcPct val="90000"/>
+              </a:lnSpc>
+              <a:spcBef>
+                <a:spcPts val="1000"/>
+              </a:spcBef>
+              <a:buFont typeface="Arial" panose="020B0604020202020204" pitchFamily="34" charset="0"/>
+              <a:buChar char="•"/>
+              <a:defRPr sz="2800" kern="1200">
+                <a:solidFill>
+                  <a:schemeClr val="bg1">
+                    <a:lumMod val="95000"/>
+                  </a:schemeClr>
+                </a:solidFill>
+                <a:latin typeface="+mn-lt"/>
+                <a:ea typeface="+mn-ea"/>
+                <a:cs typeface="+mn-cs"/>
+              </a:defRPr>
+            </a:lvl1pPr>
+            <a:lvl2pPr marL="685800" indent="-228600" algn="l" defTabSz="914400" rtl="0" eaLnBrk="1" latinLnBrk="0" hangingPunct="1">
+              <a:lnSpc>
+                <a:spcPct val="90000"/>
+              </a:lnSpc>
+              <a:spcBef>
+                <a:spcPts val="500"/>
+              </a:spcBef>
+              <a:buFont typeface="Arial" panose="020B0604020202020204" pitchFamily="34" charset="0"/>
+              <a:buChar char="•"/>
+              <a:defRPr sz="2400" kern="1200">
+                <a:solidFill>
+                  <a:schemeClr val="bg1">
+                    <a:lumMod val="95000"/>
+                  </a:schemeClr>
+                </a:solidFill>
+                <a:latin typeface="+mn-lt"/>
+                <a:ea typeface="+mn-ea"/>
+                <a:cs typeface="+mn-cs"/>
+              </a:defRPr>
+            </a:lvl2pPr>
+            <a:lvl3pPr marL="1143000" indent="-228600" algn="l" defTabSz="914400" rtl="0" eaLnBrk="1" latinLnBrk="0" hangingPunct="1">
+              <a:lnSpc>
+                <a:spcPct val="90000"/>
+              </a:lnSpc>
+              <a:spcBef>
+                <a:spcPts val="500"/>
+              </a:spcBef>
+              <a:buFont typeface="Arial" panose="020B0604020202020204" pitchFamily="34" charset="0"/>
+              <a:buChar char="•"/>
+              <a:defRPr sz="2000" kern="1200">
+                <a:solidFill>
+                  <a:schemeClr val="bg1">
+                    <a:lumMod val="95000"/>
+                  </a:schemeClr>
+                </a:solidFill>
+                <a:latin typeface="+mn-lt"/>
+                <a:ea typeface="+mn-ea"/>
+                <a:cs typeface="+mn-cs"/>
+              </a:defRPr>
+            </a:lvl3pPr>
+            <a:lvl4pPr marL="1600200" indent="-228600" algn="l" defTabSz="914400" rtl="0" eaLnBrk="1" latinLnBrk="0" hangingPunct="1">
+              <a:lnSpc>
+                <a:spcPct val="90000"/>
+              </a:lnSpc>
+              <a:spcBef>
+                <a:spcPts val="500"/>
+              </a:spcBef>
+              <a:buFont typeface="Arial" panose="020B0604020202020204" pitchFamily="34" charset="0"/>
+              <a:buChar char="•"/>
+              <a:defRPr sz="1800" kern="1200">
+                <a:solidFill>
+                  <a:schemeClr val="bg1">
+                    <a:lumMod val="95000"/>
+                  </a:schemeClr>
+                </a:solidFill>
+                <a:latin typeface="+mn-lt"/>
+                <a:ea typeface="+mn-ea"/>
+                <a:cs typeface="+mn-cs"/>
+              </a:defRPr>
+            </a:lvl4pPr>
+            <a:lvl5pPr marL="2057400" indent="-228600" algn="l" defTabSz="914400" rtl="0" eaLnBrk="1" latinLnBrk="0" hangingPunct="1">
+              <a:lnSpc>
+                <a:spcPct val="90000"/>
+              </a:lnSpc>
+              <a:spcBef>
+                <a:spcPts val="500"/>
+              </a:spcBef>
+              <a:buFont typeface="Arial" panose="020B0604020202020204" pitchFamily="34" charset="0"/>
+              <a:buChar char="•"/>
+              <a:defRPr sz="1800" kern="1200">
+                <a:solidFill>
+                  <a:schemeClr val="bg1">
+                    <a:lumMod val="95000"/>
+                  </a:schemeClr>
+                </a:solidFill>
+                <a:latin typeface="+mn-lt"/>
+                <a:ea typeface="+mn-ea"/>
+                <a:cs typeface="+mn-cs"/>
+              </a:defRPr>
+            </a:lvl5pPr>
+            <a:lvl6pPr marL="2514600" indent="-228600" algn="l" defTabSz="914400" rtl="0" eaLnBrk="1" latinLnBrk="0" hangingPunct="1">
+              <a:lnSpc>
+                <a:spcPct val="90000"/>
+              </a:lnSpc>
+              <a:spcBef>
+                <a:spcPts val="500"/>
+              </a:spcBef>
+              <a:buFont typeface="Arial" panose="020B0604020202020204" pitchFamily="34" charset="0"/>
+              <a:buChar char="•"/>
+              <a:defRPr sz="1800" kern="1200">
+                <a:solidFill>
+                  <a:schemeClr val="tx1"/>
+                </a:solidFill>
+                <a:latin typeface="+mn-lt"/>
+                <a:ea typeface="+mn-ea"/>
+                <a:cs typeface="+mn-cs"/>
+              </a:defRPr>
+            </a:lvl6pPr>
+            <a:lvl7pPr marL="2971800" indent="-228600" algn="l" defTabSz="914400" rtl="0" eaLnBrk="1" latinLnBrk="0" hangingPunct="1">
+              <a:lnSpc>
+                <a:spcPct val="90000"/>
+              </a:lnSpc>
+              <a:spcBef>
+                <a:spcPts val="500"/>
+              </a:spcBef>
+              <a:buFont typeface="Arial" panose="020B0604020202020204" pitchFamily="34" charset="0"/>
+              <a:buChar char="•"/>
+              <a:defRPr sz="1800" kern="1200">
+                <a:solidFill>
+                  <a:schemeClr val="tx1"/>
+                </a:solidFill>
+                <a:latin typeface="+mn-lt"/>
+                <a:ea typeface="+mn-ea"/>
+                <a:cs typeface="+mn-cs"/>
+              </a:defRPr>
+            </a:lvl7pPr>
+            <a:lvl8pPr marL="3429000" indent="-228600" algn="l" defTabSz="914400" rtl="0" eaLnBrk="1" latinLnBrk="0" hangingPunct="1">
+              <a:lnSpc>
+                <a:spcPct val="90000"/>
+              </a:lnSpc>
+              <a:spcBef>
+                <a:spcPts val="500"/>
+              </a:spcBef>
+              <a:buFont typeface="Arial" panose="020B0604020202020204" pitchFamily="34" charset="0"/>
+              <a:buChar char="•"/>
+              <a:defRPr sz="1800" kern="1200">
+                <a:solidFill>
+                  <a:schemeClr val="tx1"/>
+                </a:solidFill>
+                <a:latin typeface="+mn-lt"/>
+                <a:ea typeface="+mn-ea"/>
+                <a:cs typeface="+mn-cs"/>
+              </a:defRPr>
+            </a:lvl8pPr>
+            <a:lvl9pPr marL="3886200" indent="-228600" algn="l" defTabSz="914400" rtl="0" eaLnBrk="1" latinLnBrk="0" hangingPunct="1">
+              <a:lnSpc>
+                <a:spcPct val="90000"/>
+              </a:lnSpc>
+              <a:spcBef>
+                <a:spcPts val="500"/>
+              </a:spcBef>
+              <a:buFont typeface="Arial" panose="020B0604020202020204" pitchFamily="34" charset="0"/>
+              <a:buChar char="•"/>
+              <a:defRPr sz="1800" kern="1200">
+                <a:solidFill>
+                  <a:schemeClr val="tx1"/>
+                </a:solidFill>
+                <a:latin typeface="+mn-lt"/>
+                <a:ea typeface="+mn-ea"/>
+                <a:cs typeface="+mn-cs"/>
+              </a:defRPr>
+            </a:lvl9pPr>
+          </a:lstStyle>
+          <a:p>
+            <a:pPr marL="0" indent="0">
+              <a:buFont typeface="Arial" panose="020B0604020202020204" pitchFamily="34" charset="0"/>
+              <a:buNone/>
+            </a:pPr>
+            <a:r>
+              <a:rPr lang="en-AU" dirty="0"/>
+              <a:t>A Close Price above the top band, indicates a deviation from the mean, and could indicate that the price is about to fall to return to its mean. This indication can be interpreted as a good time to short the stock.</a:t>
+            </a:r>
           </a:p>
         </p:txBody>
       </p:sp>
     </p:spTree>
     <p:extLst>
       <p:ext uri="{BB962C8B-B14F-4D97-AF65-F5344CB8AC3E}">
-        <p14:creationId xmlns:p14="http://schemas.microsoft.com/office/powerpoint/2010/main" val="1551378890"/>
+        <p14:creationId xmlns:p14="http://schemas.microsoft.com/office/powerpoint/2010/main" val="1194000880"/>
+      </p:ext>
+    </p:extLst>
+  </p:cSld>
+  <p:clrMapOvr>
+    <a:masterClrMapping/>
+  </p:clrMapOvr>
+</p:sld>
+</file>
+
+<file path=ppt/slides/slide7.xml><?xml version="1.0" encoding="utf-8"?>
+<p:sld xmlns:a="http://schemas.openxmlformats.org/drawingml/2006/main" xmlns:r="http://schemas.openxmlformats.org/officeDocument/2006/relationships" xmlns:p="http://schemas.openxmlformats.org/presentationml/2006/main">
+  <p:cSld>
+    <p:spTree>
+      <p:nvGrpSpPr>
+        <p:cNvPr id="1" name=""/>
+        <p:cNvGrpSpPr/>
+        <p:nvPr/>
+      </p:nvGrpSpPr>
+      <p:grpSpPr>
+        <a:xfrm>
+          <a:off x="0" y="0"/>
+          <a:ext cx="0" cy="0"/>
+          <a:chOff x="0" y="0"/>
+          <a:chExt cx="0" cy="0"/>
+        </a:xfrm>
+      </p:grpSpPr>
+      <p:sp>
+        <p:nvSpPr>
+          <p:cNvPr id="2" name="Title 1">
+            <a:extLst>
+              <a:ext uri="{FF2B5EF4-FFF2-40B4-BE49-F238E27FC236}">
+                <a16:creationId xmlns:a16="http://schemas.microsoft.com/office/drawing/2014/main" id="{6B695928-8453-4182-B08D-6E21ADFD5ED3}"/>
+              </a:ext>
+            </a:extLst>
+          </p:cNvPr>
+          <p:cNvSpPr>
+            <a:spLocks noGrp="1"/>
+          </p:cNvSpPr>
+          <p:nvPr>
+            <p:ph type="title"/>
+          </p:nvPr>
+        </p:nvSpPr>
+        <p:spPr/>
+        <p:txBody>
+          <a:bodyPr/>
+          <a:lstStyle/>
+          <a:p>
+            <a:r>
+              <a:rPr lang="en-AU" dirty="0"/>
+              <a:t>Relative Strength Index (RSI)</a:t>
+            </a:r>
+          </a:p>
+        </p:txBody>
+      </p:sp>
+      <p:sp>
+        <p:nvSpPr>
+          <p:cNvPr id="3" name="Content Placeholder 2">
+            <a:extLst>
+              <a:ext uri="{FF2B5EF4-FFF2-40B4-BE49-F238E27FC236}">
+                <a16:creationId xmlns:a16="http://schemas.microsoft.com/office/drawing/2014/main" id="{C0A6060D-0FE3-408E-9EBF-528A8CFB93F9}"/>
+              </a:ext>
+            </a:extLst>
+          </p:cNvPr>
+          <p:cNvSpPr>
+            <a:spLocks noGrp="1"/>
+          </p:cNvSpPr>
+          <p:nvPr>
+            <p:ph idx="1"/>
+          </p:nvPr>
+        </p:nvSpPr>
+        <p:spPr/>
+        <p:txBody>
+          <a:bodyPr/>
+          <a:lstStyle/>
+          <a:p>
+            <a:pPr marL="0" indent="0">
+              <a:buNone/>
+            </a:pPr>
+            <a:r>
+              <a:rPr lang="en-AU" dirty="0"/>
+              <a:t>The Relative Strength Index is a momentum oscillator that measures the speed and change of price movements. It oscillates between 0 and 100. Traditionally the RSI is considered overbought when above 70 and oversold when below 30. You can look at different length periods for RSI, e.g. RSI(2) is when you look at RSI over 2 periods, RSI(3) for 3 periods etc.</a:t>
+            </a:r>
+          </a:p>
+          <a:p>
+            <a:pPr marL="0" indent="0">
+              <a:buNone/>
+            </a:pPr>
+            <a:r>
+              <a:rPr lang="en-AU" dirty="0"/>
+              <a:t>If RSI(3) drops to 15, it could be a good time to enter a mean reversion trade, as the stock is oversold and therefore will likely start to increase in price up to its mean, you can then take profit when the RSI reaches back above 50 or 60.</a:t>
+            </a:r>
+          </a:p>
+        </p:txBody>
+      </p:sp>
+    </p:spTree>
+    <p:extLst>
+      <p:ext uri="{BB962C8B-B14F-4D97-AF65-F5344CB8AC3E}">
+        <p14:creationId xmlns:p14="http://schemas.microsoft.com/office/powerpoint/2010/main" val="2185086997"/>
+      </p:ext>
+    </p:extLst>
+  </p:cSld>
+  <p:clrMapOvr>
+    <a:masterClrMapping/>
+  </p:clrMapOvr>
+</p:sld>
+</file>
+
+<file path=ppt/slides/slide8.xml><?xml version="1.0" encoding="utf-8"?>
+<p:sld xmlns:a="http://schemas.openxmlformats.org/drawingml/2006/main" xmlns:r="http://schemas.openxmlformats.org/officeDocument/2006/relationships" xmlns:p="http://schemas.openxmlformats.org/presentationml/2006/main">
+  <p:cSld>
+    <p:spTree>
+      <p:nvGrpSpPr>
+        <p:cNvPr id="1" name=""/>
+        <p:cNvGrpSpPr/>
+        <p:nvPr/>
+      </p:nvGrpSpPr>
+      <p:grpSpPr>
+        <a:xfrm>
+          <a:off x="0" y="0"/>
+          <a:ext cx="0" cy="0"/>
+          <a:chOff x="0" y="0"/>
+          <a:chExt cx="0" cy="0"/>
+        </a:xfrm>
+      </p:grpSpPr>
+      <p:sp>
+        <p:nvSpPr>
+          <p:cNvPr id="2" name="Title 1">
+            <a:extLst>
+              <a:ext uri="{FF2B5EF4-FFF2-40B4-BE49-F238E27FC236}">
+                <a16:creationId xmlns:a16="http://schemas.microsoft.com/office/drawing/2014/main" id="{AC883192-A03C-47FB-81B2-115FBB165658}"/>
+              </a:ext>
+            </a:extLst>
+          </p:cNvPr>
+          <p:cNvSpPr>
+            <a:spLocks noGrp="1"/>
+          </p:cNvSpPr>
+          <p:nvPr>
+            <p:ph type="title"/>
+          </p:nvPr>
+        </p:nvSpPr>
+        <p:spPr/>
+        <p:txBody>
+          <a:bodyPr/>
+          <a:lstStyle/>
+          <a:p>
+            <a:r>
+              <a:rPr lang="en-AU" dirty="0"/>
+              <a:t>And Many More!</a:t>
+            </a:r>
+          </a:p>
+        </p:txBody>
+      </p:sp>
+      <p:sp>
+        <p:nvSpPr>
+          <p:cNvPr id="3" name="Content Placeholder 2">
+            <a:extLst>
+              <a:ext uri="{FF2B5EF4-FFF2-40B4-BE49-F238E27FC236}">
+                <a16:creationId xmlns:a16="http://schemas.microsoft.com/office/drawing/2014/main" id="{6E4B59B1-0057-4539-88BB-D0C645687B47}"/>
+              </a:ext>
+            </a:extLst>
+          </p:cNvPr>
+          <p:cNvSpPr>
+            <a:spLocks noGrp="1"/>
+          </p:cNvSpPr>
+          <p:nvPr>
+            <p:ph idx="1"/>
+          </p:nvPr>
+        </p:nvSpPr>
+        <p:spPr/>
+        <p:txBody>
+          <a:bodyPr>
+            <a:normAutofit/>
+          </a:bodyPr>
+          <a:lstStyle/>
+          <a:p>
+            <a:pPr marL="0" indent="0">
+              <a:buNone/>
+            </a:pPr>
+            <a:r>
+              <a:rPr lang="en-AU" dirty="0"/>
+              <a:t>There are a number of other indicators that you can use to identify when to buy an sell for a mean reversion strategy. For example:</a:t>
+            </a:r>
+          </a:p>
+          <a:p>
+            <a:r>
+              <a:rPr lang="en-AU" dirty="0"/>
+              <a:t>Stochastics Indicator</a:t>
+            </a:r>
+          </a:p>
+          <a:p>
+            <a:r>
+              <a:rPr lang="en-AU" dirty="0"/>
+              <a:t>Internal Bar Range</a:t>
+            </a:r>
+          </a:p>
+          <a:p>
+            <a:r>
+              <a:rPr lang="en-AU" dirty="0"/>
+              <a:t>Volatility Index (VIX)</a:t>
+            </a:r>
+          </a:p>
+          <a:p>
+            <a:r>
+              <a:rPr lang="en-AU" dirty="0"/>
+              <a:t>Etc</a:t>
+            </a:r>
+          </a:p>
+          <a:p>
+            <a:pPr marL="0" indent="0">
+              <a:buNone/>
+            </a:pPr>
+            <a:r>
+              <a:rPr lang="en-AU" dirty="0"/>
+              <a:t>You will also likely want to incorporate Stop Losses and Take Profits into your strategy, as with all quantitative strategies, there is significant risk involved, especially when dealing with shorts.</a:t>
+            </a:r>
+          </a:p>
+        </p:txBody>
+      </p:sp>
+    </p:spTree>
+    <p:extLst>
+      <p:ext uri="{BB962C8B-B14F-4D97-AF65-F5344CB8AC3E}">
+        <p14:creationId xmlns:p14="http://schemas.microsoft.com/office/powerpoint/2010/main" val="341571601"/>
+      </p:ext>
+    </p:extLst>
+  </p:cSld>
+  <p:clrMapOvr>
+    <a:masterClrMapping/>
+  </p:clrMapOvr>
+</p:sld>
+</file>
+
+<file path=ppt/slides/slide9.xml><?xml version="1.0" encoding="utf-8"?>
+<p:sld xmlns:a="http://schemas.openxmlformats.org/drawingml/2006/main" xmlns:r="http://schemas.openxmlformats.org/officeDocument/2006/relationships" xmlns:p="http://schemas.openxmlformats.org/presentationml/2006/main">
+  <p:cSld>
+    <p:spTree>
+      <p:nvGrpSpPr>
+        <p:cNvPr id="1" name=""/>
+        <p:cNvGrpSpPr/>
+        <p:nvPr/>
+      </p:nvGrpSpPr>
+      <p:grpSpPr>
+        <a:xfrm>
+          <a:off x="0" y="0"/>
+          <a:ext cx="0" cy="0"/>
+          <a:chOff x="0" y="0"/>
+          <a:chExt cx="0" cy="0"/>
+        </a:xfrm>
+      </p:grpSpPr>
+      <p:sp>
+        <p:nvSpPr>
+          <p:cNvPr id="2" name="Title 1">
+            <a:extLst>
+              <a:ext uri="{FF2B5EF4-FFF2-40B4-BE49-F238E27FC236}">
+                <a16:creationId xmlns:a16="http://schemas.microsoft.com/office/drawing/2014/main" id="{75133DA1-42BF-433F-9CD3-BF05A8AE94E4}"/>
+              </a:ext>
+            </a:extLst>
+          </p:cNvPr>
+          <p:cNvSpPr>
+            <a:spLocks noGrp="1"/>
+          </p:cNvSpPr>
+          <p:nvPr>
+            <p:ph type="title"/>
+          </p:nvPr>
+        </p:nvSpPr>
+        <p:spPr/>
+        <p:txBody>
+          <a:bodyPr/>
+          <a:lstStyle/>
+          <a:p>
+            <a:r>
+              <a:rPr lang="en-AU" dirty="0"/>
+              <a:t>How do we create a strategy?</a:t>
+            </a:r>
+          </a:p>
+        </p:txBody>
+      </p:sp>
+      <p:sp>
+        <p:nvSpPr>
+          <p:cNvPr id="3" name="Content Placeholder 2">
+            <a:extLst>
+              <a:ext uri="{FF2B5EF4-FFF2-40B4-BE49-F238E27FC236}">
+                <a16:creationId xmlns:a16="http://schemas.microsoft.com/office/drawing/2014/main" id="{25B6360A-D5FE-4830-8C19-585FBB7A07BA}"/>
+              </a:ext>
+            </a:extLst>
+          </p:cNvPr>
+          <p:cNvSpPr>
+            <a:spLocks noGrp="1"/>
+          </p:cNvSpPr>
+          <p:nvPr>
+            <p:ph idx="1"/>
+          </p:nvPr>
+        </p:nvSpPr>
+        <p:spPr/>
+        <p:txBody>
+          <a:bodyPr/>
+          <a:lstStyle/>
+          <a:p>
+            <a:pPr marL="0" indent="0">
+              <a:buNone/>
+            </a:pPr>
+            <a:r>
+              <a:rPr lang="en-AU"/>
+              <a:t>Developing </a:t>
+            </a:r>
+            <a:r>
+              <a:rPr lang="en-AU" dirty="0"/>
+              <a:t>a strategy using the back-testing framework provided involves creating a logic function, which is run on each row of the input data to decide whether or not to buy, sell or hold the stock in that time period.</a:t>
+            </a:r>
+          </a:p>
+        </p:txBody>
+      </p:sp>
+    </p:spTree>
+    <p:extLst>
+      <p:ext uri="{BB962C8B-B14F-4D97-AF65-F5344CB8AC3E}">
+        <p14:creationId xmlns:p14="http://schemas.microsoft.com/office/powerpoint/2010/main" val="4079296745"/>
       </p:ext>
     </p:extLst>
   </p:cSld>

</xml_diff>

<commit_message>
Update to fee structure
</commit_message>
<xml_diff>
--- a/Mean Reversion - Project Semester 1 2022.pptx
+++ b/Mean Reversion - Project Semester 1 2022.pptx
@@ -5,10 +5,10 @@
     <p:sldMasterId id="2147483648" r:id="rId1"/>
   </p:sldMasterIdLst>
   <p:notesMasterIdLst>
-    <p:notesMasterId r:id="rId13"/>
+    <p:notesMasterId r:id="rId14"/>
   </p:notesMasterIdLst>
   <p:handoutMasterIdLst>
-    <p:handoutMasterId r:id="rId14"/>
+    <p:handoutMasterId r:id="rId15"/>
   </p:handoutMasterIdLst>
   <p:sldIdLst>
     <p:sldId id="256" r:id="rId2"/>
@@ -20,8 +20,9 @@
     <p:sldId id="266" r:id="rId8"/>
     <p:sldId id="267" r:id="rId9"/>
     <p:sldId id="261" r:id="rId10"/>
-    <p:sldId id="262" r:id="rId11"/>
-    <p:sldId id="258" r:id="rId12"/>
+    <p:sldId id="268" r:id="rId11"/>
+    <p:sldId id="262" r:id="rId12"/>
+    <p:sldId id="258" r:id="rId13"/>
   </p:sldIdLst>
   <p:sldSz cx="12192000" cy="6858000"/>
   <p:notesSz cx="6858000" cy="9144000"/>
@@ -222,7 +223,7 @@
           <a:p>
             <a:fld id="{2CCEC765-07FD-4772-879A-B1808237B269}" type="datetimeFigureOut">
               <a:rPr lang="en-AU" smtClean="0"/>
-              <a:t>14/03/2022</a:t>
+              <a:t>15/03/2022</a:t>
             </a:fld>
             <a:endParaRPr lang="en-AU"/>
           </a:p>
@@ -400,7 +401,7 @@
           <a:p>
             <a:fld id="{39563B56-85E3-484F-A5A0-A00E522ABD63}" type="datetimeFigureOut">
               <a:rPr lang="en-AU" smtClean="0"/>
-              <a:t>14/03/2022</a:t>
+              <a:t>15/03/2022</a:t>
             </a:fld>
             <a:endParaRPr lang="en-AU"/>
           </a:p>
@@ -1007,7 +1008,7 @@
           <a:p>
             <a:fld id="{4BB64F86-CCB0-48E5-907B-16003F7352B9}" type="datetime1">
               <a:rPr lang="en-AU" smtClean="0"/>
-              <a:t>14/03/2022</a:t>
+              <a:t>15/03/2022</a:t>
             </a:fld>
             <a:endParaRPr lang="en-AU"/>
           </a:p>
@@ -1217,7 +1218,7 @@
           <a:p>
             <a:fld id="{F94139E3-4F32-4579-B700-1BFD9D6316B1}" type="datetime1">
               <a:rPr lang="en-AU" smtClean="0"/>
-              <a:t>14/03/2022</a:t>
+              <a:t>15/03/2022</a:t>
             </a:fld>
             <a:endParaRPr lang="en-AU"/>
           </a:p>
@@ -1609,7 +1610,7 @@
           <a:p>
             <a:fld id="{220E72B8-329D-4704-B35D-237D6C48EE10}" type="datetime1">
               <a:rPr lang="en-AU" smtClean="0"/>
-              <a:t>14/03/2022</a:t>
+              <a:t>15/03/2022</a:t>
             </a:fld>
             <a:endParaRPr lang="en-AU" dirty="0"/>
           </a:p>
@@ -2117,7 +2118,7 @@
           <a:p>
             <a:fld id="{AF151B2F-5A2E-4CD6-979C-4A85A2E5B747}" type="datetime1">
               <a:rPr lang="en-AU" smtClean="0"/>
-              <a:t>14/03/2022</a:t>
+              <a:t>15/03/2022</a:t>
             </a:fld>
             <a:endParaRPr lang="en-AU"/>
           </a:p>
@@ -2385,7 +2386,7 @@
           <a:p>
             <a:fld id="{CED6E76D-4070-4594-BDD3-33EDDA26D675}" type="datetime1">
               <a:rPr lang="en-AU" smtClean="0"/>
-              <a:t>14/03/2022</a:t>
+              <a:t>15/03/2022</a:t>
             </a:fld>
             <a:endParaRPr lang="en-AU"/>
           </a:p>
@@ -2800,7 +2801,7 @@
           <a:p>
             <a:fld id="{DAADBCC5-374E-405C-B70E-A4F7C86276B2}" type="datetime1">
               <a:rPr lang="en-AU" smtClean="0"/>
-              <a:t>14/03/2022</a:t>
+              <a:t>15/03/2022</a:t>
             </a:fld>
             <a:endParaRPr lang="en-AU"/>
           </a:p>
@@ -2942,7 +2943,7 @@
           <a:p>
             <a:fld id="{24E72117-35D4-4034-8165-2D06278B570B}" type="datetime1">
               <a:rPr lang="en-AU" smtClean="0"/>
-              <a:t>14/03/2022</a:t>
+              <a:t>15/03/2022</a:t>
             </a:fld>
             <a:endParaRPr lang="en-AU"/>
           </a:p>
@@ -3055,7 +3056,7 @@
           <a:p>
             <a:fld id="{A2526C0B-0653-4A30-B649-AB4E8A0CE9CF}" type="datetime1">
               <a:rPr lang="en-AU" smtClean="0"/>
-              <a:t>14/03/2022</a:t>
+              <a:t>15/03/2022</a:t>
             </a:fld>
             <a:endParaRPr lang="en-AU"/>
           </a:p>
@@ -3368,7 +3369,7 @@
           <a:p>
             <a:fld id="{F00670FE-B6D9-4187-9DB7-8B5D1B54FFBA}" type="datetime1">
               <a:rPr lang="en-AU" smtClean="0"/>
-              <a:t>14/03/2022</a:t>
+              <a:t>15/03/2022</a:t>
             </a:fld>
             <a:endParaRPr lang="en-AU"/>
           </a:p>
@@ -3657,7 +3658,7 @@
           <a:p>
             <a:fld id="{3335748D-4763-4649-A209-A5EFA54628B6}" type="datetime1">
               <a:rPr lang="en-AU" smtClean="0"/>
-              <a:t>14/03/2022</a:t>
+              <a:t>15/03/2022</a:t>
             </a:fld>
             <a:endParaRPr lang="en-AU"/>
           </a:p>
@@ -3903,7 +3904,7 @@
           <a:p>
             <a:fld id="{EB663D97-2F57-4B17-AA6F-F6A672E7E853}" type="datetime1">
               <a:rPr lang="en-AU" smtClean="0"/>
-              <a:t>14/03/2022</a:t>
+              <a:t>15/03/2022</a:t>
             </a:fld>
             <a:endParaRPr lang="en-AU"/>
           </a:p>
@@ -4647,6 +4648,95 @@
           <p:cNvPr id="2" name="Title 1">
             <a:extLst>
               <a:ext uri="{FF2B5EF4-FFF2-40B4-BE49-F238E27FC236}">
+                <a16:creationId xmlns:a16="http://schemas.microsoft.com/office/drawing/2014/main" id="{41A7DE75-3E6A-4776-B948-7429DA1B3C90}"/>
+              </a:ext>
+            </a:extLst>
+          </p:cNvPr>
+          <p:cNvSpPr>
+            <a:spLocks noGrp="1"/>
+          </p:cNvSpPr>
+          <p:nvPr>
+            <p:ph type="title"/>
+          </p:nvPr>
+        </p:nvSpPr>
+        <p:spPr/>
+        <p:txBody>
+          <a:bodyPr/>
+          <a:lstStyle/>
+          <a:p>
+            <a:r>
+              <a:rPr lang="en-AU" dirty="0"/>
+              <a:t>Code Walkthrough</a:t>
+            </a:r>
+          </a:p>
+        </p:txBody>
+      </p:sp>
+      <p:sp>
+        <p:nvSpPr>
+          <p:cNvPr id="3" name="Content Placeholder 2">
+            <a:extLst>
+              <a:ext uri="{FF2B5EF4-FFF2-40B4-BE49-F238E27FC236}">
+                <a16:creationId xmlns:a16="http://schemas.microsoft.com/office/drawing/2014/main" id="{EB1321FE-D2B8-4856-9AE8-E7C60B132FF4}"/>
+              </a:ext>
+            </a:extLst>
+          </p:cNvPr>
+          <p:cNvSpPr>
+            <a:spLocks noGrp="1"/>
+          </p:cNvSpPr>
+          <p:nvPr>
+            <p:ph idx="1"/>
+          </p:nvPr>
+        </p:nvSpPr>
+        <p:spPr/>
+        <p:txBody>
+          <a:bodyPr/>
+          <a:lstStyle/>
+          <a:p>
+            <a:pPr marL="0" indent="0">
+              <a:buNone/>
+            </a:pPr>
+            <a:r>
+              <a:rPr lang="en-AU" dirty="0"/>
+              <a:t>Here I’ll give a walkthrough of the skeleton code that I’ve given you. I would recommend reading through it at the same time on your computers. Most of it is fairly well documented, but if you need any help understanding anything please reach out to me.</a:t>
+            </a:r>
+          </a:p>
+        </p:txBody>
+      </p:sp>
+    </p:spTree>
+    <p:extLst>
+      <p:ext uri="{BB962C8B-B14F-4D97-AF65-F5344CB8AC3E}">
+        <p14:creationId xmlns:p14="http://schemas.microsoft.com/office/powerpoint/2010/main" val="1944207457"/>
+      </p:ext>
+    </p:extLst>
+  </p:cSld>
+  <p:clrMapOvr>
+    <a:masterClrMapping/>
+  </p:clrMapOvr>
+</p:sld>
+</file>
+
+<file path=ppt/slides/slide11.xml><?xml version="1.0" encoding="utf-8"?>
+<p:sld xmlns:a="http://schemas.openxmlformats.org/drawingml/2006/main" xmlns:r="http://schemas.openxmlformats.org/officeDocument/2006/relationships" xmlns:p="http://schemas.openxmlformats.org/presentationml/2006/main">
+  <p:cSld>
+    <p:spTree>
+      <p:nvGrpSpPr>
+        <p:cNvPr id="1" name=""/>
+        <p:cNvGrpSpPr/>
+        <p:nvPr/>
+      </p:nvGrpSpPr>
+      <p:grpSpPr>
+        <a:xfrm>
+          <a:off x="0" y="0"/>
+          <a:ext cx="0" cy="0"/>
+          <a:chOff x="0" y="0"/>
+          <a:chExt cx="0" cy="0"/>
+        </a:xfrm>
+      </p:grpSpPr>
+      <p:sp>
+        <p:nvSpPr>
+          <p:cNvPr id="2" name="Title 1">
+            <a:extLst>
+              <a:ext uri="{FF2B5EF4-FFF2-40B4-BE49-F238E27FC236}">
                 <a16:creationId xmlns:a16="http://schemas.microsoft.com/office/drawing/2014/main" id="{7A805161-F0A5-4BDB-9483-42E1C006804A}"/>
               </a:ext>
             </a:extLst>
@@ -4746,7 +4836,7 @@
 </p:sld>
 </file>
 
-<file path=ppt/slides/slide11.xml><?xml version="1.0" encoding="utf-8"?>
+<file path=ppt/slides/slide12.xml><?xml version="1.0" encoding="utf-8"?>
 <p:sld xmlns:a="http://schemas.openxmlformats.org/drawingml/2006/main" xmlns:r="http://schemas.openxmlformats.org/officeDocument/2006/relationships" xmlns:p="http://schemas.openxmlformats.org/presentationml/2006/main">
   <p:cSld>
     <p:spTree>
@@ -5958,16 +6048,42 @@
               <a:buNone/>
             </a:pPr>
             <a:r>
-              <a:rPr lang="en-AU"/>
-              <a:t>Developing </a:t>
-            </a:r>
-            <a:r>
               <a:rPr lang="en-AU" dirty="0"/>
-              <a:t>a strategy using the back-testing framework provided involves creating a logic function, which is run on each row of the input data to decide whether or not to buy, sell or hold the stock in that time period.</a:t>
-            </a:r>
-          </a:p>
-        </p:txBody>
-      </p:sp>
+              <a:t>Developing a strategy using the back-testing framework provided involves creating a logic function, which is run on each row of the input data to decide whether or not to buy, sell or hold the stock in that time period.</a:t>
+            </a:r>
+          </a:p>
+        </p:txBody>
+      </p:sp>
+      <p:pic>
+        <p:nvPicPr>
+          <p:cNvPr id="5" name="Picture 4">
+            <a:extLst>
+              <a:ext uri="{FF2B5EF4-FFF2-40B4-BE49-F238E27FC236}">
+                <a16:creationId xmlns:a16="http://schemas.microsoft.com/office/drawing/2014/main" id="{6E13FBDF-597E-49F4-8844-4063FC6ED822}"/>
+              </a:ext>
+            </a:extLst>
+          </p:cNvPr>
+          <p:cNvPicPr>
+            <a:picLocks noChangeAspect="1"/>
+          </p:cNvPicPr>
+          <p:nvPr/>
+        </p:nvPicPr>
+        <p:blipFill>
+          <a:blip r:embed="rId2"/>
+          <a:stretch>
+            <a:fillRect/>
+          </a:stretch>
+        </p:blipFill>
+        <p:spPr>
+          <a:xfrm>
+            <a:off x="2161309" y="3212743"/>
+            <a:ext cx="9904020" cy="3121052"/>
+          </a:xfrm>
+          <a:prstGeom prst="rect">
+            <a:avLst/>
+          </a:prstGeom>
+        </p:spPr>
+      </p:pic>
     </p:spTree>
     <p:extLst>
       <p:ext uri="{BB962C8B-B14F-4D97-AF65-F5344CB8AC3E}">

</xml_diff>